<commit_message>
Update LLM based Document Information Extraction.pptx
</commit_message>
<xml_diff>
--- a/Presentation/LLM based Document Information Extraction.pptx
+++ b/Presentation/LLM based Document Information Extraction.pptx
@@ -230,7 +230,7 @@
           <a:p>
             <a:fld id="{C17F2C1D-F243-42AB-ADF2-E7CB4E04900E}" type="datetimeFigureOut">
               <a:rPr lang="en-US" smtClean="0"/>
-              <a:t>11/14/2023</a:t>
+              <a:t>11/15/2023</a:t>
             </a:fld>
             <a:endParaRPr lang="en-US"/>
           </a:p>
@@ -407,7 +407,7 @@
           <a:p>
             <a:fld id="{020CE34E-5667-4A32-A6BA-10C7A552BC63}" type="datetimeFigureOut">
               <a:rPr lang="en-US" smtClean="0"/>
-              <a:t>11/14/2023</a:t>
+              <a:t>11/15/2023</a:t>
             </a:fld>
             <a:endParaRPr lang="en-US"/>
           </a:p>
@@ -802,6 +802,37 @@
           <a:bodyPr/>
           <a:lstStyle/>
           <a:p>
+            <a:r>
+              <a:rPr lang="en-US" b="0" i="0" dirty="0">
+                <a:solidFill>
+                  <a:srgbClr val="374151"/>
+                </a:solidFill>
+                <a:effectLst/>
+                <a:latin typeface="Söhne"/>
+              </a:rPr>
+              <a:t>As businesses grapple with vast amounts of unstructured data locked within PDF documents, the need for a solution that not only reads but truly understands the content is paramount. Traditional Optical Character Recognition (OCR) systems, while proficient at recognizing text, often fall short when it comes to deciphering the nuances of complex document structures. This is where LLMs step in to take the lead.</a:t>
+            </a:r>
+          </a:p>
+          <a:p>
+            <a:endParaRPr lang="en-US" b="0" i="0" dirty="0">
+              <a:solidFill>
+                <a:srgbClr val="374151"/>
+              </a:solidFill>
+              <a:effectLst/>
+              <a:latin typeface="Söhne"/>
+            </a:endParaRPr>
+          </a:p>
+          <a:p>
+            <a:r>
+              <a:rPr lang="en-US" b="0" i="0" dirty="0">
+                <a:solidFill>
+                  <a:srgbClr val="374151"/>
+                </a:solidFill>
+                <a:effectLst/>
+                <a:latin typeface="Söhne"/>
+              </a:rPr>
+              <a:t>Imagine a scenario where every document, regardless of its complexity, is effortlessly translated into a structured JSON format, preserving the integrity of the data while making it infinitely more accessible and usable. This demo showcases precisely that capability.</a:t>
+            </a:r>
             <a:endParaRPr lang="en-US" dirty="0"/>
           </a:p>
         </p:txBody>
@@ -886,6 +917,67 @@
           <a:bodyPr/>
           <a:lstStyle/>
           <a:p>
+            <a:r>
+              <a:rPr lang="en-US" b="0" i="0" dirty="0">
+                <a:solidFill>
+                  <a:srgbClr val="374151"/>
+                </a:solidFill>
+                <a:effectLst/>
+                <a:latin typeface="Söhne"/>
+              </a:rPr>
+              <a:t>Powered by Python, our demo harnesses the formidable capabilities of LLMs to read, interpret, and convert unstructured PDF data into meticulously structured JSONs. The beauty of this approach lies in the innate understanding that LLMs bring to the table. Unlike OCRs that merely recognize characters, LLMs comprehend the context, discern relationships between elements, and generate structured outputs that mirror the true essence of the document.</a:t>
+            </a:r>
+          </a:p>
+          <a:p>
+            <a:endParaRPr lang="en-US" b="0" i="0" dirty="0">
+              <a:solidFill>
+                <a:srgbClr val="374151"/>
+              </a:solidFill>
+              <a:effectLst/>
+              <a:latin typeface="Söhne"/>
+            </a:endParaRPr>
+          </a:p>
+          <a:p>
+            <a:pPr marL="0" marR="0" lvl="0" indent="0" algn="l" defTabSz="914400" rtl="0" eaLnBrk="1" fontAlgn="auto" latinLnBrk="0" hangingPunct="1">
+              <a:lnSpc>
+                <a:spcPct val="100000"/>
+              </a:lnSpc>
+              <a:spcBef>
+                <a:spcPts val="0"/>
+              </a:spcBef>
+              <a:spcAft>
+                <a:spcPts val="0"/>
+              </a:spcAft>
+              <a:buClrTx/>
+              <a:buSzTx/>
+              <a:buFontTx/>
+              <a:buNone/>
+              <a:tabLst/>
+              <a:defRPr/>
+            </a:pPr>
+            <a:r>
+              <a:rPr lang="en-US" b="0" i="0" dirty="0">
+                <a:solidFill>
+                  <a:srgbClr val="374151"/>
+                </a:solidFill>
+                <a:effectLst/>
+                <a:latin typeface="Söhne"/>
+              </a:rPr>
+              <a:t>Through an intuitive and seamless process, the demo navigates through complex document layouts, varying fonts, and diverse content types, ensuring a reliable and consistent transformation every time. Witness firsthand how LLMs effortlessly handle the intricacies of invoices (demo), legal documents (demo) transcending the limitations of traditional OCR technology.</a:t>
+            </a:r>
+          </a:p>
+          <a:p>
+            <a:pPr algn="l"/>
+            <a:r>
+              <a:rPr lang="en-US" b="0" i="0" dirty="0">
+                <a:solidFill>
+                  <a:srgbClr val="374151"/>
+                </a:solidFill>
+                <a:effectLst/>
+                <a:latin typeface="Söhne"/>
+              </a:rPr>
+              <a:t>The same can be applied to research papers, invoices, and more.</a:t>
+            </a:r>
             <a:endParaRPr lang="en-US" dirty="0"/>
           </a:p>
         </p:txBody>
@@ -970,6 +1062,70 @@
           <a:bodyPr/>
           <a:lstStyle/>
           <a:p>
+            <a:r>
+              <a:rPr lang="en-US" b="0" i="0" dirty="0">
+                <a:solidFill>
+                  <a:srgbClr val="374151"/>
+                </a:solidFill>
+                <a:effectLst/>
+                <a:latin typeface="Söhne"/>
+              </a:rPr>
+              <a:t>The implications of this advancement are profound. Businesses can now streamline their data extraction processes, enhance decision-making based on accurately interpreted information, and significantly reduce the time and effort spent on manual data structuring. The era of converting unstructured PDFs to structured JSONs has arrived, and it's powered by the unparalleled intelligence of LLMs.</a:t>
+            </a:r>
+          </a:p>
+          <a:p>
+            <a:endParaRPr lang="en-US" b="0" i="0" dirty="0">
+              <a:solidFill>
+                <a:srgbClr val="374151"/>
+              </a:solidFill>
+              <a:effectLst/>
+              <a:latin typeface="Söhne"/>
+            </a:endParaRPr>
+          </a:p>
+          <a:p>
+            <a:r>
+              <a:rPr lang="en-US" b="0" i="0" dirty="0">
+                <a:solidFill>
+                  <a:srgbClr val="374151"/>
+                </a:solidFill>
+                <a:effectLst/>
+                <a:latin typeface="Söhne"/>
+              </a:rPr>
+              <a:t>The question which still needs humans to take a decision, when and how to use this. </a:t>
+            </a:r>
+          </a:p>
+          <a:p>
+            <a:r>
+              <a:rPr lang="en-US" b="0" i="0" dirty="0">
+                <a:solidFill>
+                  <a:srgbClr val="374151"/>
+                </a:solidFill>
+                <a:effectLst/>
+                <a:latin typeface="Söhne"/>
+              </a:rPr>
+              <a:t>Maintenance of production systems cost anything between 1.5 to 12 times the implementation costs, it needs to be done in a proper way and it needs to be worth it.</a:t>
+            </a:r>
+          </a:p>
+          <a:p>
+            <a:endParaRPr lang="en-US" b="0" i="0" dirty="0">
+              <a:solidFill>
+                <a:srgbClr val="374151"/>
+              </a:solidFill>
+              <a:effectLst/>
+              <a:latin typeface="Söhne"/>
+            </a:endParaRPr>
+          </a:p>
+          <a:p>
+            <a:r>
+              <a:rPr lang="en-US" b="0" i="0" dirty="0">
+                <a:solidFill>
+                  <a:srgbClr val="374151"/>
+                </a:solidFill>
+                <a:effectLst/>
+                <a:latin typeface="Söhne"/>
+              </a:rPr>
+              <a:t>The next wave will be about document processing software’s scaling up for the future and using LLM’s.</a:t>
+            </a:r>
             <a:endParaRPr lang="en-US" dirty="0"/>
           </a:p>
         </p:txBody>
@@ -12864,8 +13020,8 @@
         </p:nvSpPr>
         <p:spPr>
           <a:xfrm>
-            <a:off x="7523430" y="1051550"/>
-            <a:ext cx="4588560" cy="3004401"/>
+            <a:off x="7523430" y="644892"/>
+            <a:ext cx="4588560" cy="3503229"/>
           </a:xfrm>
         </p:spPr>
         <p:txBody>
@@ -12875,9 +13031,38 @@
           <a:lstStyle/>
           <a:p>
             <a:r>
-              <a:rPr lang="en-US" dirty="0"/>
-              <a:t>LLM based Document Information Extraction</a:t>
+              <a:rPr lang="en-US" sz="4000" dirty="0">
+                <a:solidFill>
+                  <a:schemeClr val="accent1">
+                    <a:lumMod val="20000"/>
+                    <a:lumOff val="80000"/>
+                  </a:schemeClr>
+                </a:solidFill>
+                <a:latin typeface="Söhne"/>
+              </a:rPr>
+              <a:t>Revolutionizing Document Transformation: Unleashing the Power of LLMs for </a:t>
             </a:r>
+            <a:r>
+              <a:rPr lang="en-US" sz="4000" b="0" i="0" dirty="0">
+                <a:solidFill>
+                  <a:schemeClr val="accent1">
+                    <a:lumMod val="20000"/>
+                    <a:lumOff val="80000"/>
+                  </a:schemeClr>
+                </a:solidFill>
+                <a:effectLst/>
+                <a:latin typeface="Söhne"/>
+              </a:rPr>
+              <a:t>Document processing</a:t>
+            </a:r>
+            <a:endParaRPr lang="en-US" sz="4000" dirty="0">
+              <a:solidFill>
+                <a:schemeClr val="accent1">
+                  <a:lumMod val="20000"/>
+                  <a:lumOff val="80000"/>
+                </a:schemeClr>
+              </a:solidFill>
+            </a:endParaRPr>
           </a:p>
         </p:txBody>
       </p:sp>
@@ -12933,8 +13118,8 @@
         </p:nvSpPr>
         <p:spPr>
           <a:xfrm>
-            <a:off x="7523430" y="4148122"/>
-            <a:ext cx="3565524" cy="1731963"/>
+            <a:off x="7523430" y="4359878"/>
+            <a:ext cx="3565524" cy="356501"/>
           </a:xfrm>
         </p:spPr>
         <p:txBody>
@@ -12947,6 +13132,235 @@
               <a:rPr lang="en-US" dirty="0"/>
               <a:t>Ashish Easow</a:t>
             </a:r>
+          </a:p>
+        </p:txBody>
+      </p:sp>
+      <p:sp>
+        <p:nvSpPr>
+          <p:cNvPr id="4" name="Subtitle 2">
+            <a:extLst>
+              <a:ext uri="{FF2B5EF4-FFF2-40B4-BE49-F238E27FC236}">
+                <a16:creationId xmlns:a16="http://schemas.microsoft.com/office/drawing/2014/main" id="{2138B383-CB99-E982-1E05-4754ED03853D}"/>
+              </a:ext>
+            </a:extLst>
+          </p:cNvPr>
+          <p:cNvSpPr txBox="1">
+            <a:spLocks/>
+          </p:cNvSpPr>
+          <p:nvPr/>
+        </p:nvSpPr>
+        <p:spPr>
+          <a:xfrm>
+            <a:off x="7637330" y="6283326"/>
+            <a:ext cx="3565524" cy="356501"/>
+          </a:xfrm>
+          <a:prstGeom prst="rect">
+            <a:avLst/>
+          </a:prstGeom>
+        </p:spPr>
+        <p:txBody>
+          <a:bodyPr vert="horz" wrap="square" lIns="0" tIns="0" rIns="0" bIns="0" rtlCol="0">
+            <a:normAutofit/>
+          </a:bodyPr>
+          <a:lstStyle>
+            <a:lvl1pPr marL="228600" indent="-228600" algn="l" defTabSz="914400" rtl="0" eaLnBrk="1" latinLnBrk="0" hangingPunct="1">
+              <a:lnSpc>
+                <a:spcPct val="110000"/>
+              </a:lnSpc>
+              <a:spcBef>
+                <a:spcPts val="1000"/>
+              </a:spcBef>
+              <a:spcAft>
+                <a:spcPts val="800"/>
+              </a:spcAft>
+              <a:buFont typeface="Arial" panose="020B0604020202020204" pitchFamily="34" charset="0"/>
+              <a:buNone/>
+              <a:defRPr sz="2000" kern="1200">
+                <a:solidFill>
+                  <a:schemeClr val="tx1">
+                    <a:alpha val="60000"/>
+                  </a:schemeClr>
+                </a:solidFill>
+                <a:latin typeface="+mn-lt"/>
+                <a:ea typeface="+mn-ea"/>
+                <a:cs typeface="+mn-cs"/>
+              </a:defRPr>
+            </a:lvl1pPr>
+            <a:lvl2pPr marL="685800" indent="-228600" algn="l" defTabSz="914400" rtl="0" eaLnBrk="1" latinLnBrk="0" hangingPunct="1">
+              <a:lnSpc>
+                <a:spcPct val="110000"/>
+              </a:lnSpc>
+              <a:spcBef>
+                <a:spcPts val="500"/>
+              </a:spcBef>
+              <a:spcAft>
+                <a:spcPts val="800"/>
+              </a:spcAft>
+              <a:buFont typeface="Arial" panose="020B0604020202020204" pitchFamily="34" charset="0"/>
+              <a:buNone/>
+              <a:defRPr sz="2000" kern="1200">
+                <a:solidFill>
+                  <a:schemeClr val="tx1">
+                    <a:alpha val="60000"/>
+                  </a:schemeClr>
+                </a:solidFill>
+                <a:latin typeface="+mn-lt"/>
+                <a:ea typeface="+mn-ea"/>
+                <a:cs typeface="+mn-cs"/>
+              </a:defRPr>
+            </a:lvl2pPr>
+            <a:lvl3pPr marL="1143000" indent="-228600" algn="l" defTabSz="914400" rtl="0" eaLnBrk="1" latinLnBrk="0" hangingPunct="1">
+              <a:lnSpc>
+                <a:spcPct val="110000"/>
+              </a:lnSpc>
+              <a:spcBef>
+                <a:spcPts val="500"/>
+              </a:spcBef>
+              <a:spcAft>
+                <a:spcPts val="800"/>
+              </a:spcAft>
+              <a:buFont typeface="Arial" panose="020B0604020202020204" pitchFamily="34" charset="0"/>
+              <a:buNone/>
+              <a:defRPr sz="2000" kern="1200">
+                <a:solidFill>
+                  <a:schemeClr val="tx1">
+                    <a:alpha val="60000"/>
+                  </a:schemeClr>
+                </a:solidFill>
+                <a:latin typeface="+mn-lt"/>
+                <a:ea typeface="+mn-ea"/>
+                <a:cs typeface="+mn-cs"/>
+              </a:defRPr>
+            </a:lvl3pPr>
+            <a:lvl4pPr marL="1600200" indent="-228600" algn="l" defTabSz="914400" rtl="0" eaLnBrk="1" latinLnBrk="0" hangingPunct="1">
+              <a:lnSpc>
+                <a:spcPct val="110000"/>
+              </a:lnSpc>
+              <a:spcBef>
+                <a:spcPts val="500"/>
+              </a:spcBef>
+              <a:spcAft>
+                <a:spcPts val="800"/>
+              </a:spcAft>
+              <a:buFont typeface="Arial" panose="020B0604020202020204" pitchFamily="34" charset="0"/>
+              <a:buNone/>
+              <a:defRPr sz="2000" kern="1200">
+                <a:solidFill>
+                  <a:schemeClr val="tx1">
+                    <a:alpha val="60000"/>
+                  </a:schemeClr>
+                </a:solidFill>
+                <a:latin typeface="+mn-lt"/>
+                <a:ea typeface="+mn-ea"/>
+                <a:cs typeface="+mn-cs"/>
+              </a:defRPr>
+            </a:lvl4pPr>
+            <a:lvl5pPr marL="2057400" indent="-228600" algn="l" defTabSz="914400" rtl="0" eaLnBrk="1" latinLnBrk="0" hangingPunct="1">
+              <a:lnSpc>
+                <a:spcPct val="110000"/>
+              </a:lnSpc>
+              <a:spcBef>
+                <a:spcPts val="500"/>
+              </a:spcBef>
+              <a:spcAft>
+                <a:spcPts val="800"/>
+              </a:spcAft>
+              <a:buFont typeface="Arial" panose="020B0604020202020204" pitchFamily="34" charset="0"/>
+              <a:buNone/>
+              <a:defRPr sz="2000" kern="1200">
+                <a:solidFill>
+                  <a:schemeClr val="tx1">
+                    <a:alpha val="60000"/>
+                  </a:schemeClr>
+                </a:solidFill>
+                <a:latin typeface="+mn-lt"/>
+                <a:ea typeface="+mn-ea"/>
+                <a:cs typeface="+mn-cs"/>
+              </a:defRPr>
+            </a:lvl5pPr>
+            <a:lvl6pPr marL="2514600" indent="-228600" algn="l" defTabSz="914400" rtl="0" eaLnBrk="1" latinLnBrk="0" hangingPunct="1">
+              <a:lnSpc>
+                <a:spcPct val="90000"/>
+              </a:lnSpc>
+              <a:spcBef>
+                <a:spcPts val="500"/>
+              </a:spcBef>
+              <a:buFont typeface="Arial" panose="020B0604020202020204" pitchFamily="34" charset="0"/>
+              <a:buChar char="•"/>
+              <a:defRPr sz="1800" kern="1200">
+                <a:solidFill>
+                  <a:schemeClr val="tx1"/>
+                </a:solidFill>
+                <a:latin typeface="+mn-lt"/>
+                <a:ea typeface="+mn-ea"/>
+                <a:cs typeface="+mn-cs"/>
+              </a:defRPr>
+            </a:lvl6pPr>
+            <a:lvl7pPr marL="2971800" indent="-228600" algn="l" defTabSz="914400" rtl="0" eaLnBrk="1" latinLnBrk="0" hangingPunct="1">
+              <a:lnSpc>
+                <a:spcPct val="90000"/>
+              </a:lnSpc>
+              <a:spcBef>
+                <a:spcPts val="500"/>
+              </a:spcBef>
+              <a:buFont typeface="Arial" panose="020B0604020202020204" pitchFamily="34" charset="0"/>
+              <a:buChar char="•"/>
+              <a:defRPr sz="1800" kern="1200">
+                <a:solidFill>
+                  <a:schemeClr val="tx1"/>
+                </a:solidFill>
+                <a:latin typeface="+mn-lt"/>
+                <a:ea typeface="+mn-ea"/>
+                <a:cs typeface="+mn-cs"/>
+              </a:defRPr>
+            </a:lvl7pPr>
+            <a:lvl8pPr marL="3429000" indent="-228600" algn="l" defTabSz="914400" rtl="0" eaLnBrk="1" latinLnBrk="0" hangingPunct="1">
+              <a:lnSpc>
+                <a:spcPct val="90000"/>
+              </a:lnSpc>
+              <a:spcBef>
+                <a:spcPts val="500"/>
+              </a:spcBef>
+              <a:buFont typeface="Arial" panose="020B0604020202020204" pitchFamily="34" charset="0"/>
+              <a:buChar char="•"/>
+              <a:defRPr sz="1800" kern="1200">
+                <a:solidFill>
+                  <a:schemeClr val="tx1"/>
+                </a:solidFill>
+                <a:latin typeface="+mn-lt"/>
+                <a:ea typeface="+mn-ea"/>
+                <a:cs typeface="+mn-cs"/>
+              </a:defRPr>
+            </a:lvl8pPr>
+            <a:lvl9pPr marL="3886200" indent="-228600" algn="l" defTabSz="914400" rtl="0" eaLnBrk="1" latinLnBrk="0" hangingPunct="1">
+              <a:lnSpc>
+                <a:spcPct val="90000"/>
+              </a:lnSpc>
+              <a:spcBef>
+                <a:spcPts val="500"/>
+              </a:spcBef>
+              <a:buFont typeface="Arial" panose="020B0604020202020204" pitchFamily="34" charset="0"/>
+              <a:buChar char="•"/>
+              <a:defRPr sz="1800" kern="1200">
+                <a:solidFill>
+                  <a:schemeClr val="tx1"/>
+                </a:solidFill>
+                <a:latin typeface="+mn-lt"/>
+                <a:ea typeface="+mn-ea"/>
+                <a:cs typeface="+mn-cs"/>
+              </a:defRPr>
+            </a:lvl9pPr>
+          </a:lstStyle>
+          <a:p>
+            <a:r>
+              <a:rPr lang="en-US" sz="900" dirty="0"/>
+              <a:t>* Assistant credits – </a:t>
+            </a:r>
+            <a:r>
+              <a:rPr lang="en-US" sz="900" dirty="0" err="1"/>
+              <a:t>ChatGPT</a:t>
+            </a:r>
+            <a:endParaRPr lang="en-US" sz="900" dirty="0"/>
           </a:p>
         </p:txBody>
       </p:sp>
@@ -13428,7 +13842,7 @@
         </p:spPr>
         <p:txBody>
           <a:bodyPr>
-            <a:normAutofit fontScale="92500" lnSpcReduction="10000"/>
+            <a:normAutofit fontScale="92500" lnSpcReduction="20000"/>
           </a:bodyPr>
           <a:lstStyle/>
           <a:p>
@@ -13445,7 +13859,7 @@
             </a:r>
             <a:r>
               <a:rPr lang="en-US" dirty="0"/>
-              <a:t>, Bard, LLAMA2 amongst others are at the forefront of digital innovation. So, what's stopping us from combining both.</a:t>
+              <a:t>, Bard, LLAMA2, Mistral 7B amongst others are at the forefront of digital innovation. So, what's stopping us from combining both.</a:t>
             </a:r>
           </a:p>
         </p:txBody>
@@ -14612,7 +15026,7 @@
         <p:spPr>
           <a:xfrm>
             <a:off x="206831" y="141913"/>
-            <a:ext cx="5437187" cy="1062654"/>
+            <a:ext cx="7204622" cy="1062654"/>
           </a:xfrm>
         </p:spPr>
         <p:txBody>
@@ -14635,7 +15049,7 @@
                 <a:ea typeface="+mj-ea"/>
                 <a:cs typeface="+mj-cs"/>
               </a:rPr>
-              <a:t>Architecture</a:t>
+              <a:t>POC Architecture</a:t>
             </a:r>
           </a:p>
         </p:txBody>
@@ -15200,7 +15614,7 @@
         </p:nvSpPr>
         <p:spPr>
           <a:xfrm>
-            <a:off x="8591414" y="2408413"/>
+            <a:off x="9091444" y="3280839"/>
             <a:ext cx="2856682" cy="369332"/>
           </a:xfrm>
           <a:prstGeom prst="rect">
@@ -15235,8 +15649,8 @@
         </p:nvSpPr>
         <p:spPr>
           <a:xfrm>
-            <a:off x="2240518" y="2481219"/>
-            <a:ext cx="2229595" cy="369332"/>
+            <a:off x="2374789" y="1935763"/>
+            <a:ext cx="2525250" cy="923330"/>
           </a:xfrm>
           <a:prstGeom prst="rect">
             <a:avLst/>
@@ -15258,7 +15672,7 @@
                   </a:schemeClr>
                 </a:solidFill>
               </a:rPr>
-              <a:t>2. Integrate with LLM</a:t>
+              <a:t>2. Integrate with LLM and send unstructured data for processing</a:t>
             </a:r>
           </a:p>
         </p:txBody>
@@ -15277,8 +15691,8 @@
         </p:nvSpPr>
         <p:spPr>
           <a:xfrm>
-            <a:off x="6015824" y="1675892"/>
-            <a:ext cx="2166313" cy="923330"/>
+            <a:off x="8728334" y="1658764"/>
+            <a:ext cx="3379866" cy="1200329"/>
           </a:xfrm>
           <a:prstGeom prst="rect">
             <a:avLst/>
@@ -15291,6 +15705,9 @@
           </a:bodyPr>
           <a:lstStyle/>
           <a:p>
+            <a:pPr marL="342900" indent="-342900">
+              <a:buAutoNum type="arabicPeriod"/>
+            </a:pPr>
             <a:r>
               <a:rPr lang="en-IN" dirty="0">
                 <a:solidFill>
@@ -15300,7 +15717,84 @@
                   </a:schemeClr>
                 </a:solidFill>
               </a:rPr>
-              <a:t>1. Read Raw/Unstructured data from documents</a:t>
+              <a:t>Read Raw/Unstructured data from documents</a:t>
+            </a:r>
+          </a:p>
+          <a:p>
+            <a:pPr algn="ctr"/>
+            <a:r>
+              <a:rPr lang="en-IN" dirty="0">
+                <a:solidFill>
+                  <a:schemeClr val="accent2">
+                    <a:lumMod val="60000"/>
+                    <a:lumOff val="40000"/>
+                  </a:schemeClr>
+                </a:solidFill>
+              </a:rPr>
+              <a:t>(</a:t>
+            </a:r>
+            <a:r>
+              <a:rPr lang="en-IN" dirty="0">
+                <a:solidFill>
+                  <a:schemeClr val="accent1">
+                    <a:lumMod val="60000"/>
+                    <a:lumOff val="40000"/>
+                  </a:schemeClr>
+                </a:solidFill>
+              </a:rPr>
+              <a:t>Digital using </a:t>
+            </a:r>
+            <a:r>
+              <a:rPr lang="en-IN" dirty="0" err="1">
+                <a:solidFill>
+                  <a:schemeClr val="accent1">
+                    <a:lumMod val="60000"/>
+                    <a:lumOff val="40000"/>
+                  </a:schemeClr>
+                </a:solidFill>
+              </a:rPr>
+              <a:t>pdfplumber</a:t>
+            </a:r>
+            <a:r>
+              <a:rPr lang="en-IN" dirty="0">
+                <a:solidFill>
+                  <a:schemeClr val="accent1">
+                    <a:lumMod val="60000"/>
+                    <a:lumOff val="40000"/>
+                  </a:schemeClr>
+                </a:solidFill>
+              </a:rPr>
+              <a:t> </a:t>
+            </a:r>
+            <a:r>
+              <a:rPr lang="en-IN" dirty="0">
+                <a:solidFill>
+                  <a:schemeClr val="accent2">
+                    <a:lumMod val="60000"/>
+                    <a:lumOff val="40000"/>
+                  </a:schemeClr>
+                </a:solidFill>
+              </a:rPr>
+              <a:t>or </a:t>
+            </a:r>
+            <a:r>
+              <a:rPr lang="en-IN" dirty="0">
+                <a:solidFill>
+                  <a:srgbClr val="FFC000"/>
+                </a:solidFill>
+              </a:rPr>
+              <a:t>Scanned using Tesseract</a:t>
+            </a:r>
+            <a:r>
+              <a:rPr lang="en-IN" dirty="0">
+                <a:solidFill>
+                  <a:schemeClr val="accent2">
+                    <a:lumMod val="60000"/>
+                    <a:lumOff val="40000"/>
+                  </a:schemeClr>
+                </a:solidFill>
+              </a:rPr>
+              <a:t>)</a:t>
             </a:r>
           </a:p>
         </p:txBody>
@@ -15319,7 +15813,7 @@
         </p:nvSpPr>
         <p:spPr>
           <a:xfrm>
-            <a:off x="3077043" y="3517137"/>
+            <a:off x="3123064" y="3712724"/>
             <a:ext cx="2229595" cy="923330"/>
           </a:xfrm>
           <a:prstGeom prst="rect">
@@ -16374,6 +16868,34 @@
 </file>
 
 <file path=customXml/item1.xml><?xml version="1.0" encoding="utf-8"?>
+<?mso-contentType ?>
+<FormTemplates xmlns="http://schemas.microsoft.com/sharepoint/v3/contenttype/forms">
+  <Display>DocumentLibraryForm</Display>
+  <Edit>DocumentLibraryForm</Edit>
+  <New>DocumentLibraryForm</New>
+</FormTemplates>
+</file>
+
+<file path=customXml/item2.xml><?xml version="1.0" encoding="utf-8"?>
+<p:properties xmlns:p="http://schemas.microsoft.com/office/2006/metadata/properties" xmlns:xsi="http://www.w3.org/2001/XMLSchema-instance" xmlns:pc="http://schemas.microsoft.com/office/infopath/2007/PartnerControls">
+  <documentManagement>
+    <_ip_UnifiedCompliancePolicyUIAction xmlns="http://schemas.microsoft.com/sharepoint/v3" xsi:nil="true"/>
+    <Image xmlns="71af3243-3dd4-4a8d-8c0d-dd76da1f02a5">
+      <Url xsi:nil="true"/>
+      <Description xsi:nil="true"/>
+    </Image>
+    <Status xmlns="71af3243-3dd4-4a8d-8c0d-dd76da1f02a5">Not started</Status>
+    <_ip_UnifiedCompliancePolicyProperties xmlns="http://schemas.microsoft.com/sharepoint/v3" xsi:nil="true"/>
+    <lcf76f155ced4ddcb4097134ff3c332f xmlns="71af3243-3dd4-4a8d-8c0d-dd76da1f02a5">
+      <Terms xmlns="http://schemas.microsoft.com/office/infopath/2007/PartnerControls"/>
+    </lcf76f155ced4ddcb4097134ff3c332f>
+    <TaxCatchAll xmlns="230e9df3-be65-4c73-a93b-d1236ebd677e"/>
+    <MediaServiceKeyPoints xmlns="71af3243-3dd4-4a8d-8c0d-dd76da1f02a5" xsi:nil="true"/>
+  </documentManagement>
+</p:properties>
+</file>
+
+<file path=customXml/item3.xml><?xml version="1.0" encoding="utf-8"?>
 <ct:contentTypeSchema xmlns:ct="http://schemas.microsoft.com/office/2006/metadata/contentType" xmlns:ma="http://schemas.microsoft.com/office/2006/metadata/properties/metaAttributes" ct:_="" ma:_="" ma:contentTypeName="Document" ma:contentTypeID="0x01010079F111ED35F8CC479449609E8A0923A6" ma:contentTypeVersion="18" ma:contentTypeDescription="Create a new document." ma:contentTypeScope="" ma:versionID="22a266b9fa9a230c5a512669d8b298c3">
   <xsd:schema xmlns:xsd="http://www.w3.org/2001/XMLSchema" xmlns:xs="http://www.w3.org/2001/XMLSchema" xmlns:p="http://schemas.microsoft.com/office/2006/metadata/properties" xmlns:ns1="http://schemas.microsoft.com/sharepoint/v3" xmlns:ns2="71af3243-3dd4-4a8d-8c0d-dd76da1f02a5" xmlns:ns3="16c05727-aa75-4e4a-9b5f-8a80a1165891" xmlns:ns4="230e9df3-be65-4c73-a93b-d1236ebd677e" targetNamespace="http://schemas.microsoft.com/office/2006/metadata/properties" ma:root="true" ma:fieldsID="eddc33fff6b14141ee5c74a0d29ea6a1" ns1:_="" ns2:_="" ns3:_="" ns4:_="">
     <xsd:import namespace="http://schemas.microsoft.com/sharepoint/v3"/>
@@ -16649,35 +17171,27 @@
 </ct:contentTypeSchema>
 </file>
 
-<file path=customXml/item2.xml><?xml version="1.0" encoding="utf-8"?>
-<p:properties xmlns:p="http://schemas.microsoft.com/office/2006/metadata/properties" xmlns:xsi="http://www.w3.org/2001/XMLSchema-instance" xmlns:pc="http://schemas.microsoft.com/office/infopath/2007/PartnerControls">
-  <documentManagement>
-    <_ip_UnifiedCompliancePolicyUIAction xmlns="http://schemas.microsoft.com/sharepoint/v3" xsi:nil="true"/>
-    <Image xmlns="71af3243-3dd4-4a8d-8c0d-dd76da1f02a5">
-      <Url xsi:nil="true"/>
-      <Description xsi:nil="true"/>
-    </Image>
-    <Status xmlns="71af3243-3dd4-4a8d-8c0d-dd76da1f02a5">Not started</Status>
-    <_ip_UnifiedCompliancePolicyProperties xmlns="http://schemas.microsoft.com/sharepoint/v3" xsi:nil="true"/>
-    <lcf76f155ced4ddcb4097134ff3c332f xmlns="71af3243-3dd4-4a8d-8c0d-dd76da1f02a5">
-      <Terms xmlns="http://schemas.microsoft.com/office/infopath/2007/PartnerControls"/>
-    </lcf76f155ced4ddcb4097134ff3c332f>
-    <TaxCatchAll xmlns="230e9df3-be65-4c73-a93b-d1236ebd677e"/>
-    <MediaServiceKeyPoints xmlns="71af3243-3dd4-4a8d-8c0d-dd76da1f02a5" xsi:nil="true"/>
-  </documentManagement>
-</p:properties>
+<file path=customXml/itemProps1.xml><?xml version="1.0" encoding="utf-8"?>
+<ds:datastoreItem xmlns:ds="http://schemas.openxmlformats.org/officeDocument/2006/customXml" ds:itemID="{DF76BC85-9361-4044-951E-1D698143E543}">
+  <ds:schemaRefs>
+    <ds:schemaRef ds:uri="http://schemas.microsoft.com/sharepoint/v3/contenttype/forms"/>
+  </ds:schemaRefs>
+</ds:datastoreItem>
 </file>
 
-<file path=customXml/item3.xml><?xml version="1.0" encoding="utf-8"?>
-<?mso-contentType ?>
-<FormTemplates xmlns="http://schemas.microsoft.com/sharepoint/v3/contenttype/forms">
-  <Display>DocumentLibraryForm</Display>
-  <Edit>DocumentLibraryForm</Edit>
-  <New>DocumentLibraryForm</New>
-</FormTemplates>
+<file path=customXml/itemProps2.xml><?xml version="1.0" encoding="utf-8"?>
+<ds:datastoreItem xmlns:ds="http://schemas.openxmlformats.org/officeDocument/2006/customXml" ds:itemID="{CF128D9D-8887-4AE7-BD39-EBCD268E911A}">
+  <ds:schemaRefs>
+    <ds:schemaRef ds:uri="http://schemas.microsoft.com/office/2006/metadata/properties"/>
+    <ds:schemaRef ds:uri="http://schemas.microsoft.com/office/infopath/2007/PartnerControls"/>
+    <ds:schemaRef ds:uri="http://schemas.microsoft.com/sharepoint/v3"/>
+    <ds:schemaRef ds:uri="71af3243-3dd4-4a8d-8c0d-dd76da1f02a5"/>
+    <ds:schemaRef ds:uri="230e9df3-be65-4c73-a93b-d1236ebd677e"/>
+  </ds:schemaRefs>
+</ds:datastoreItem>
 </file>
 
-<file path=customXml/itemProps1.xml><?xml version="1.0" encoding="utf-8"?>
+<file path=customXml/itemProps3.xml><?xml version="1.0" encoding="utf-8"?>
 <ds:datastoreItem xmlns:ds="http://schemas.openxmlformats.org/officeDocument/2006/customXml" ds:itemID="{5A163FB7-958F-4794-B3EE-EC8933868F09}">
   <ds:schemaRefs>
     <ds:schemaRef ds:uri="http://schemas.microsoft.com/office/2006/metadata/contentType"/>
@@ -16698,26 +17212,6 @@
 </ds:datastoreItem>
 </file>
 
-<file path=customXml/itemProps2.xml><?xml version="1.0" encoding="utf-8"?>
-<ds:datastoreItem xmlns:ds="http://schemas.openxmlformats.org/officeDocument/2006/customXml" ds:itemID="{CF128D9D-8887-4AE7-BD39-EBCD268E911A}">
-  <ds:schemaRefs>
-    <ds:schemaRef ds:uri="http://schemas.microsoft.com/office/2006/metadata/properties"/>
-    <ds:schemaRef ds:uri="http://schemas.microsoft.com/office/infopath/2007/PartnerControls"/>
-    <ds:schemaRef ds:uri="http://schemas.microsoft.com/sharepoint/v3"/>
-    <ds:schemaRef ds:uri="71af3243-3dd4-4a8d-8c0d-dd76da1f02a5"/>
-    <ds:schemaRef ds:uri="230e9df3-be65-4c73-a93b-d1236ebd677e"/>
-  </ds:schemaRefs>
-</ds:datastoreItem>
-</file>
-
-<file path=customXml/itemProps3.xml><?xml version="1.0" encoding="utf-8"?>
-<ds:datastoreItem xmlns:ds="http://schemas.openxmlformats.org/officeDocument/2006/customXml" ds:itemID="{DF76BC85-9361-4044-951E-1D698143E543}">
-  <ds:schemaRefs>
-    <ds:schemaRef ds:uri="http://schemas.microsoft.com/sharepoint/v3/contenttype/forms"/>
-  </ds:schemaRefs>
-</ds:datastoreItem>
-</file>
-
 <file path=docMetadata/LabelInfo.xml><?xml version="1.0" encoding="utf-8"?>
 <clbl:labelList xmlns:clbl="http://schemas.microsoft.com/office/2020/mipLabelMetadata">
   <clbl:label id="{f42aa342-8706-4288-bd11-ebb85995028c}" enabled="1" method="Standard" siteId="{72f988bf-86f1-41af-91ab-2d7cd011db47}" contentBits="0" removed="0"/>

</xml_diff>